<commit_message>
arreglado un typo en la presentación que la hacía LITERALLY UNPLAYABLE
</commit_message>
<xml_diff>
--- a/Documentation/PROYECTO PA 2017-2018.pptx
+++ b/Documentation/PROYECTO PA 2017-2018.pptx
@@ -128,6 +128,10 @@
 </p:presentation>
 </file>
 
+<file path=ppt/revisionInfo.xml><?xml version="1.0" encoding="utf-8"?>
+<p1510:revInfo xmlns:a="http://schemas.openxmlformats.org/drawingml/2006/main" xmlns:r="http://schemas.openxmlformats.org/officeDocument/2006/relationships" xmlns:p1510="http://schemas.microsoft.com/office/powerpoint/2015/10/main"/>
+</file>
+
 <file path=ppt/notesMasters/notesMaster1.xml><?xml version="1.0" encoding="utf-8"?>
 <p:notesMaster xmlns:a="http://schemas.openxmlformats.org/drawingml/2006/main" xmlns:r="http://schemas.openxmlformats.org/officeDocument/2006/relationships" xmlns:p="http://schemas.openxmlformats.org/presentationml/2006/main">
   <p:cSld>
@@ -210,7 +214,7 @@
           <a:p>
             <a:fld id="{A5C20BB3-3CCB-4FE5-991B-82F6BCB48AF3}" type="datetimeFigureOut">
               <a:rPr lang="en-US" smtClean="0"/>
-              <a:t>1/23/2018</a:t>
+              <a:t>1/24/2018</a:t>
             </a:fld>
             <a:endParaRPr lang="en-US"/>
           </a:p>
@@ -1012,7 +1016,7 @@
           <a:p>
             <a:fld id="{1555EDF9-3D79-45DA-8367-2F63551C4C7D}" type="datetimeFigureOut">
               <a:rPr lang="en-US" smtClean="0"/>
-              <a:t>1/23/2018</a:t>
+              <a:t>1/24/2018</a:t>
             </a:fld>
             <a:endParaRPr lang="en-US"/>
           </a:p>
@@ -1259,7 +1263,7 @@
           <a:p>
             <a:fld id="{1555EDF9-3D79-45DA-8367-2F63551C4C7D}" type="datetimeFigureOut">
               <a:rPr lang="en-US" smtClean="0"/>
-              <a:t>1/23/2018</a:t>
+              <a:t>1/24/2018</a:t>
             </a:fld>
             <a:endParaRPr lang="en-US"/>
           </a:p>
@@ -1645,7 +1649,7 @@
           <a:p>
             <a:fld id="{1555EDF9-3D79-45DA-8367-2F63551C4C7D}" type="datetimeFigureOut">
               <a:rPr lang="en-US" smtClean="0"/>
-              <a:t>1/23/2018</a:t>
+              <a:t>1/24/2018</a:t>
             </a:fld>
             <a:endParaRPr lang="en-US"/>
           </a:p>
@@ -1874,7 +1878,7 @@
           <a:p>
             <a:fld id="{1555EDF9-3D79-45DA-8367-2F63551C4C7D}" type="datetimeFigureOut">
               <a:rPr lang="en-US" smtClean="0"/>
-              <a:t>1/23/2018</a:t>
+              <a:t>1/24/2018</a:t>
             </a:fld>
             <a:endParaRPr lang="en-US"/>
           </a:p>
@@ -2365,7 +2369,7 @@
           <a:p>
             <a:fld id="{1555EDF9-3D79-45DA-8367-2F63551C4C7D}" type="datetimeFigureOut">
               <a:rPr lang="en-US" smtClean="0"/>
-              <a:t>1/23/2018</a:t>
+              <a:t>1/24/2018</a:t>
             </a:fld>
             <a:endParaRPr lang="en-US"/>
           </a:p>
@@ -2675,7 +2679,7 @@
           <a:p>
             <a:fld id="{1555EDF9-3D79-45DA-8367-2F63551C4C7D}" type="datetimeFigureOut">
               <a:rPr lang="en-US" smtClean="0"/>
-              <a:t>1/23/2018</a:t>
+              <a:t>1/24/2018</a:t>
             </a:fld>
             <a:endParaRPr lang="en-US"/>
           </a:p>
@@ -3066,7 +3070,7 @@
           <a:p>
             <a:fld id="{1555EDF9-3D79-45DA-8367-2F63551C4C7D}" type="datetimeFigureOut">
               <a:rPr lang="en-US" smtClean="0"/>
-              <a:t>1/23/2018</a:t>
+              <a:t>1/24/2018</a:t>
             </a:fld>
             <a:endParaRPr lang="en-US"/>
           </a:p>
@@ -3184,7 +3188,7 @@
           <a:p>
             <a:fld id="{1555EDF9-3D79-45DA-8367-2F63551C4C7D}" type="datetimeFigureOut">
               <a:rPr lang="en-US" smtClean="0"/>
-              <a:t>1/23/2018</a:t>
+              <a:t>1/24/2018</a:t>
             </a:fld>
             <a:endParaRPr lang="en-US"/>
           </a:p>
@@ -3279,7 +3283,7 @@
           <a:p>
             <a:fld id="{1555EDF9-3D79-45DA-8367-2F63551C4C7D}" type="datetimeFigureOut">
               <a:rPr lang="en-US" smtClean="0"/>
-              <a:t>1/23/2018</a:t>
+              <a:t>1/24/2018</a:t>
             </a:fld>
             <a:endParaRPr lang="en-US"/>
           </a:p>
@@ -3579,7 +3583,7 @@
           <a:p>
             <a:fld id="{1555EDF9-3D79-45DA-8367-2F63551C4C7D}" type="datetimeFigureOut">
               <a:rPr lang="en-US" smtClean="0"/>
-              <a:t>1/23/2018</a:t>
+              <a:t>1/24/2018</a:t>
             </a:fld>
             <a:endParaRPr lang="en-US"/>
           </a:p>
@@ -3844,7 +3848,7 @@
           <a:p>
             <a:fld id="{1555EDF9-3D79-45DA-8367-2F63551C4C7D}" type="datetimeFigureOut">
               <a:rPr lang="en-US" smtClean="0"/>
-              <a:t>1/23/2018</a:t>
+              <a:t>1/24/2018</a:t>
             </a:fld>
             <a:endParaRPr lang="en-US"/>
           </a:p>
@@ -4262,7 +4266,7 @@
           <a:p>
             <a:fld id="{1555EDF9-3D79-45DA-8367-2F63551C4C7D}" type="datetimeFigureOut">
               <a:rPr lang="en-US" smtClean="0"/>
-              <a:t>1/23/2018</a:t>
+              <a:t>1/24/2018</a:t>
             </a:fld>
             <a:endParaRPr lang="en-US"/>
           </a:p>
@@ -5991,15 +5995,15 @@
             </a:r>
             <a:r>
               <a:rPr lang="en-US" dirty="0"/>
-              <a:t> Visa, </a:t>
-            </a:r>
-            <a:r>
-              <a:rPr lang="en-US" dirty="0" err="1"/>
-              <a:t>MasterCart</a:t>
+              <a:t> Visa</a:t>
+            </a:r>
+            <a:r>
+              <a:rPr lang="en-US"/>
+              <a:t>, MasterCard </a:t>
             </a:r>
             <a:r>
               <a:rPr lang="en-US" dirty="0"/>
-              <a:t> y American Express</a:t>
+              <a:t>y American Express</a:t>
             </a:r>
           </a:p>
           <a:p>

</xml_diff>

<commit_message>
arreglado lo de los portatiles y los nombres en la ppt
</commit_message>
<xml_diff>
--- a/Documentation/PROYECTO PA 2017-2018.pptx
+++ b/Documentation/PROYECTO PA 2017-2018.pptx
@@ -4823,8 +4823,8 @@
         </p:nvSpPr>
         <p:spPr>
           <a:xfrm>
-            <a:off x="1524000" y="4495800"/>
-            <a:ext cx="9144000" cy="762000"/>
+            <a:off x="1524000" y="4495799"/>
+            <a:ext cx="9144000" cy="2013155"/>
           </a:xfrm>
         </p:spPr>
         <p:txBody>
@@ -4835,7 +4835,42 @@
           <a:p>
             <a:r>
               <a:rPr lang="en-US" sz="1800" dirty="0"/>
-              <a:t>GRUPO 07</a:t>
+              <a:t>GRUPO 07:</a:t>
+            </a:r>
+          </a:p>
+          <a:p>
+            <a:pPr marL="285750" indent="-285750">
+              <a:buFont typeface="Arial" panose="020B0604020202020204" pitchFamily="34" charset="0"/>
+              <a:buChar char="•"/>
+            </a:pPr>
+            <a:r>
+              <a:rPr lang="en-US" sz="1800" dirty="0"/>
+              <a:t>Víctor Martinelli Rodríguez</a:t>
+            </a:r>
+          </a:p>
+          <a:p>
+            <a:pPr marL="285750" indent="-285750">
+              <a:buFont typeface="Arial" panose="020B0604020202020204" pitchFamily="34" charset="0"/>
+              <a:buChar char="•"/>
+            </a:pPr>
+            <a:r>
+              <a:rPr lang="en-US" sz="1800" dirty="0"/>
+              <a:t>Pablo Oliva </a:t>
+            </a:r>
+            <a:r>
+              <a:rPr lang="en-US" sz="1800" dirty="0" err="1"/>
+              <a:t>Navea</a:t>
+            </a:r>
+            <a:endParaRPr lang="en-US" sz="1800" dirty="0"/>
+          </a:p>
+          <a:p>
+            <a:pPr marL="285750" indent="-285750">
+              <a:buFont typeface="Arial" panose="020B0604020202020204" pitchFamily="34" charset="0"/>
+              <a:buChar char="•"/>
+            </a:pPr>
+            <a:r>
+              <a:rPr lang="en-US" sz="1800" dirty="0"/>
+              <a:t>Manuel Ridao Pineda</a:t>
             </a:r>
             <a:endParaRPr sz="1800" dirty="0"/>
           </a:p>

</xml_diff>